<commit_message>
Updated architecture, implement local cache
Updated architecture, implement local cache
</commit_message>
<xml_diff>
--- a/SystemDesign.pptx
+++ b/SystemDesign.pptx
@@ -197,7 +197,7 @@
           <a:p>
             <a:fld id="{6EF79A1B-7F08-44E2-A725-96F74DBFF349}" type="datetimeFigureOut">
               <a:rPr lang="en-US" smtClean="0"/>
-              <a:t>10/3/2021</a:t>
+              <a:t>10/8/2021</a:t>
             </a:fld>
             <a:endParaRPr lang="en-US"/>
           </a:p>
@@ -708,7 +708,7 @@
           <a:p>
             <a:fld id="{DC49E735-4310-4790-B0ED-EA79B9FD8112}" type="datetimeFigureOut">
               <a:rPr lang="en-US" smtClean="0"/>
-              <a:t>10/3/2021</a:t>
+              <a:t>10/8/2021</a:t>
             </a:fld>
             <a:endParaRPr lang="en-US"/>
           </a:p>
@@ -906,7 +906,7 @@
           <a:p>
             <a:fld id="{DC49E735-4310-4790-B0ED-EA79B9FD8112}" type="datetimeFigureOut">
               <a:rPr lang="en-US" smtClean="0"/>
-              <a:t>10/3/2021</a:t>
+              <a:t>10/8/2021</a:t>
             </a:fld>
             <a:endParaRPr lang="en-US"/>
           </a:p>
@@ -1114,7 +1114,7 @@
           <a:p>
             <a:fld id="{DC49E735-4310-4790-B0ED-EA79B9FD8112}" type="datetimeFigureOut">
               <a:rPr lang="en-US" smtClean="0"/>
-              <a:t>10/3/2021</a:t>
+              <a:t>10/8/2021</a:t>
             </a:fld>
             <a:endParaRPr lang="en-US"/>
           </a:p>
@@ -1312,7 +1312,7 @@
           <a:p>
             <a:fld id="{DC49E735-4310-4790-B0ED-EA79B9FD8112}" type="datetimeFigureOut">
               <a:rPr lang="en-US" smtClean="0"/>
-              <a:t>10/3/2021</a:t>
+              <a:t>10/8/2021</a:t>
             </a:fld>
             <a:endParaRPr lang="en-US"/>
           </a:p>
@@ -1587,7 +1587,7 @@
           <a:p>
             <a:fld id="{DC49E735-4310-4790-B0ED-EA79B9FD8112}" type="datetimeFigureOut">
               <a:rPr lang="en-US" smtClean="0"/>
-              <a:t>10/3/2021</a:t>
+              <a:t>10/8/2021</a:t>
             </a:fld>
             <a:endParaRPr lang="en-US"/>
           </a:p>
@@ -1852,7 +1852,7 @@
           <a:p>
             <a:fld id="{DC49E735-4310-4790-B0ED-EA79B9FD8112}" type="datetimeFigureOut">
               <a:rPr lang="en-US" smtClean="0"/>
-              <a:t>10/3/2021</a:t>
+              <a:t>10/8/2021</a:t>
             </a:fld>
             <a:endParaRPr lang="en-US"/>
           </a:p>
@@ -2264,7 +2264,7 @@
           <a:p>
             <a:fld id="{DC49E735-4310-4790-B0ED-EA79B9FD8112}" type="datetimeFigureOut">
               <a:rPr lang="en-US" smtClean="0"/>
-              <a:t>10/3/2021</a:t>
+              <a:t>10/8/2021</a:t>
             </a:fld>
             <a:endParaRPr lang="en-US"/>
           </a:p>
@@ -2405,7 +2405,7 @@
           <a:p>
             <a:fld id="{DC49E735-4310-4790-B0ED-EA79B9FD8112}" type="datetimeFigureOut">
               <a:rPr lang="en-US" smtClean="0"/>
-              <a:t>10/3/2021</a:t>
+              <a:t>10/8/2021</a:t>
             </a:fld>
             <a:endParaRPr lang="en-US"/>
           </a:p>
@@ -2518,7 +2518,7 @@
           <a:p>
             <a:fld id="{DC49E735-4310-4790-B0ED-EA79B9FD8112}" type="datetimeFigureOut">
               <a:rPr lang="en-US" smtClean="0"/>
-              <a:t>10/3/2021</a:t>
+              <a:t>10/8/2021</a:t>
             </a:fld>
             <a:endParaRPr lang="en-US"/>
           </a:p>
@@ -2829,7 +2829,7 @@
           <a:p>
             <a:fld id="{DC49E735-4310-4790-B0ED-EA79B9FD8112}" type="datetimeFigureOut">
               <a:rPr lang="en-US" smtClean="0"/>
-              <a:t>10/3/2021</a:t>
+              <a:t>10/8/2021</a:t>
             </a:fld>
             <a:endParaRPr lang="en-US"/>
           </a:p>
@@ -3117,7 +3117,7 @@
           <a:p>
             <a:fld id="{DC49E735-4310-4790-B0ED-EA79B9FD8112}" type="datetimeFigureOut">
               <a:rPr lang="en-US" smtClean="0"/>
-              <a:t>10/3/2021</a:t>
+              <a:t>10/8/2021</a:t>
             </a:fld>
             <a:endParaRPr lang="en-US"/>
           </a:p>
@@ -3358,7 +3358,7 @@
           <a:p>
             <a:fld id="{DC49E735-4310-4790-B0ED-EA79B9FD8112}" type="datetimeFigureOut">
               <a:rPr lang="en-US" smtClean="0"/>
-              <a:t>10/3/2021</a:t>
+              <a:t>10/8/2021</a:t>
             </a:fld>
             <a:endParaRPr lang="en-US"/>
           </a:p>
@@ -3783,97 +3783,6 @@
           <a:chExt cx="0" cy="0"/>
         </a:xfrm>
       </p:grpSpPr>
-      <p:pic>
-        <p:nvPicPr>
-          <p:cNvPr id="1026" name="Picture 2" descr="Amazon Web Services Icon Png, Transparent Png , Transparent Png Image -  PNGitem">
-            <a:extLst>
-              <a:ext uri="{FF2B5EF4-FFF2-40B4-BE49-F238E27FC236}">
-                <a16:creationId xmlns:a16="http://schemas.microsoft.com/office/drawing/2014/main" id="{7E24C0E3-ECC4-402A-8051-D800DEF8348C}"/>
-              </a:ext>
-            </a:extLst>
-          </p:cNvPr>
-          <p:cNvPicPr>
-            <a:picLocks noChangeAspect="1" noChangeArrowheads="1"/>
-          </p:cNvPicPr>
-          <p:nvPr/>
-        </p:nvPicPr>
-        <p:blipFill>
-          <a:blip r:embed="rId3">
-            <a:extLst>
-              <a:ext uri="{28A0092B-C50C-407E-A947-70E740481C1C}">
-                <a14:useLocalDpi xmlns:a14="http://schemas.microsoft.com/office/drawing/2010/main" val="0"/>
-              </a:ext>
-            </a:extLst>
-          </a:blip>
-          <a:stretch>
-            <a:fillRect/>
-          </a:stretch>
-        </p:blipFill>
-        <p:spPr bwMode="auto">
-          <a:xfrm>
-            <a:off x="349267" y="2251464"/>
-            <a:ext cx="783410" cy="403456"/>
-          </a:xfrm>
-          <a:prstGeom prst="rect">
-            <a:avLst/>
-          </a:prstGeom>
-          <a:noFill/>
-          <a:extLst>
-            <a:ext uri="{909E8E84-426E-40DD-AFC4-6F175D3DCCD1}">
-              <a14:hiddenFill xmlns:a14="http://schemas.microsoft.com/office/drawing/2010/main">
-                <a:solidFill>
-                  <a:srgbClr val="FFFFFF"/>
-                </a:solidFill>
-              </a14:hiddenFill>
-            </a:ext>
-          </a:extLst>
-        </p:spPr>
-      </p:pic>
-      <p:sp>
-        <p:nvSpPr>
-          <p:cNvPr id="6" name="TextBox 5">
-            <a:extLst>
-              <a:ext uri="{FF2B5EF4-FFF2-40B4-BE49-F238E27FC236}">
-                <a16:creationId xmlns:a16="http://schemas.microsoft.com/office/drawing/2014/main" id="{25B0262B-3DF7-4B94-82AD-4AEA1C4D06B2}"/>
-              </a:ext>
-            </a:extLst>
-          </p:cNvPr>
-          <p:cNvSpPr txBox="1"/>
-          <p:nvPr/>
-        </p:nvSpPr>
-        <p:spPr>
-          <a:xfrm>
-            <a:off x="349267" y="2701979"/>
-            <a:ext cx="918358" cy="215444"/>
-          </a:xfrm>
-          <a:prstGeom prst="rect">
-            <a:avLst/>
-          </a:prstGeom>
-          <a:noFill/>
-        </p:spPr>
-        <p:txBody>
-          <a:bodyPr wrap="square">
-            <a:spAutoFit/>
-          </a:bodyPr>
-          <a:lstStyle/>
-          <a:p>
-            <a:r>
-              <a:rPr lang="en-US" sz="800" dirty="0" err="1">
-                <a:latin typeface="Arial" panose="020B0604020202020204" pitchFamily="34" charset="0"/>
-                <a:cs typeface="Arial" panose="020B0604020202020204" pitchFamily="34" charset="0"/>
-              </a:rPr>
-              <a:t>gdelt</a:t>
-            </a:r>
-            <a:r>
-              <a:rPr lang="en-US" sz="800" dirty="0">
-                <a:latin typeface="Arial" panose="020B0604020202020204" pitchFamily="34" charset="0"/>
-                <a:cs typeface="Arial" panose="020B0604020202020204" pitchFamily="34" charset="0"/>
-              </a:rPr>
-              <a:t>-open-data</a:t>
-            </a:r>
-          </a:p>
-        </p:txBody>
-      </p:sp>
       <p:cxnSp>
         <p:nvCxnSpPr>
           <p:cNvPr id="7" name="Straight Connector 6">
@@ -3890,8 +3799,8 @@
         </p:nvCxnSpPr>
         <p:spPr>
           <a:xfrm flipH="1">
-            <a:off x="1132677" y="3286907"/>
-            <a:ext cx="10707022" cy="0"/>
+            <a:off x="1267625" y="3275370"/>
+            <a:ext cx="9325673" cy="24990"/>
           </a:xfrm>
           <a:prstGeom prst="line">
             <a:avLst/>
@@ -3914,6 +3823,97 @@
       </p:cxnSp>
       <p:pic>
         <p:nvPicPr>
+          <p:cNvPr id="1026" name="Picture 2" descr="Amazon Web Services Icon Png, Transparent Png , Transparent Png Image -  PNGitem">
+            <a:extLst>
+              <a:ext uri="{FF2B5EF4-FFF2-40B4-BE49-F238E27FC236}">
+                <a16:creationId xmlns:a16="http://schemas.microsoft.com/office/drawing/2014/main" id="{7E24C0E3-ECC4-402A-8051-D800DEF8348C}"/>
+              </a:ext>
+            </a:extLst>
+          </p:cNvPr>
+          <p:cNvPicPr>
+            <a:picLocks noChangeAspect="1" noChangeArrowheads="1"/>
+          </p:cNvPicPr>
+          <p:nvPr/>
+        </p:nvPicPr>
+        <p:blipFill>
+          <a:blip r:embed="rId3">
+            <a:extLst>
+              <a:ext uri="{28A0092B-C50C-407E-A947-70E740481C1C}">
+                <a14:useLocalDpi xmlns:a14="http://schemas.microsoft.com/office/drawing/2010/main" val="0"/>
+              </a:ext>
+            </a:extLst>
+          </a:blip>
+          <a:stretch>
+            <a:fillRect/>
+          </a:stretch>
+        </p:blipFill>
+        <p:spPr bwMode="auto">
+          <a:xfrm>
+            <a:off x="349267" y="1399696"/>
+            <a:ext cx="783410" cy="403456"/>
+          </a:xfrm>
+          <a:prstGeom prst="rect">
+            <a:avLst/>
+          </a:prstGeom>
+          <a:noFill/>
+          <a:extLst>
+            <a:ext uri="{909E8E84-426E-40DD-AFC4-6F175D3DCCD1}">
+              <a14:hiddenFill xmlns:a14="http://schemas.microsoft.com/office/drawing/2010/main">
+                <a:solidFill>
+                  <a:srgbClr val="FFFFFF"/>
+                </a:solidFill>
+              </a14:hiddenFill>
+            </a:ext>
+          </a:extLst>
+        </p:spPr>
+      </p:pic>
+      <p:sp>
+        <p:nvSpPr>
+          <p:cNvPr id="6" name="TextBox 5">
+            <a:extLst>
+              <a:ext uri="{FF2B5EF4-FFF2-40B4-BE49-F238E27FC236}">
+                <a16:creationId xmlns:a16="http://schemas.microsoft.com/office/drawing/2014/main" id="{25B0262B-3DF7-4B94-82AD-4AEA1C4D06B2}"/>
+              </a:ext>
+            </a:extLst>
+          </p:cNvPr>
+          <p:cNvSpPr txBox="1"/>
+          <p:nvPr/>
+        </p:nvSpPr>
+        <p:spPr>
+          <a:xfrm>
+            <a:off x="349267" y="1850211"/>
+            <a:ext cx="918358" cy="215444"/>
+          </a:xfrm>
+          <a:prstGeom prst="rect">
+            <a:avLst/>
+          </a:prstGeom>
+          <a:noFill/>
+        </p:spPr>
+        <p:txBody>
+          <a:bodyPr wrap="square">
+            <a:spAutoFit/>
+          </a:bodyPr>
+          <a:lstStyle/>
+          <a:p>
+            <a:r>
+              <a:rPr lang="en-US" sz="800" dirty="0" err="1">
+                <a:latin typeface="Arial" panose="020B0604020202020204" pitchFamily="34" charset="0"/>
+                <a:cs typeface="Arial" panose="020B0604020202020204" pitchFamily="34" charset="0"/>
+              </a:rPr>
+              <a:t>gdelt</a:t>
+            </a:r>
+            <a:r>
+              <a:rPr lang="en-US" sz="800" dirty="0">
+                <a:latin typeface="Arial" panose="020B0604020202020204" pitchFamily="34" charset="0"/>
+                <a:cs typeface="Arial" panose="020B0604020202020204" pitchFamily="34" charset="0"/>
+              </a:rPr>
+              <a:t>-open-data</a:t>
+            </a:r>
+          </a:p>
+        </p:txBody>
+      </p:sp>
+      <p:pic>
+        <p:nvPicPr>
           <p:cNvPr id="1028" name="Picture 4" descr="AWS SageMaker Updates 2019. New features released at re:Invent in… | by  Kyle Stahl | Towards Data Science">
             <a:extLst>
               <a:ext uri="{FF2B5EF4-FFF2-40B4-BE49-F238E27FC236}">
@@ -3973,8 +3973,8 @@
         </p:nvSpPr>
         <p:spPr>
           <a:xfrm>
-            <a:off x="7276146" y="1476269"/>
-            <a:ext cx="1137696" cy="338554"/>
+            <a:off x="7239063" y="1801476"/>
+            <a:ext cx="1391255" cy="215444"/>
           </a:xfrm>
           <a:prstGeom prst="rect">
             <a:avLst/>
@@ -4026,7 +4026,7 @@
         </p:blipFill>
         <p:spPr bwMode="auto">
           <a:xfrm>
-            <a:off x="4104302" y="4254940"/>
+            <a:off x="4404926" y="4254940"/>
             <a:ext cx="1245858" cy="781301"/>
           </a:xfrm>
           <a:prstGeom prst="rect">
@@ -4058,8 +4058,8 @@
         </p:nvSpPr>
         <p:spPr>
           <a:xfrm>
-            <a:off x="2086509" y="3640042"/>
-            <a:ext cx="1509864" cy="584775"/>
+            <a:off x="1402364" y="3673731"/>
+            <a:ext cx="1599933" cy="584775"/>
           </a:xfrm>
           <a:prstGeom prst="rect">
             <a:avLst/>
@@ -4077,21 +4077,7 @@
                 <a:latin typeface="Arial" panose="020B0604020202020204" pitchFamily="34" charset="0"/>
                 <a:cs typeface="Arial" panose="020B0604020202020204" pitchFamily="34" charset="0"/>
               </a:rPr>
-              <a:t>S&amp;P 500 </a:t>
-            </a:r>
-            <a:r>
-              <a:rPr lang="en-US" sz="800" dirty="0" err="1">
-                <a:latin typeface="Arial" panose="020B0604020202020204" pitchFamily="34" charset="0"/>
-                <a:cs typeface="Arial" panose="020B0604020202020204" pitchFamily="34" charset="0"/>
-              </a:rPr>
-              <a:t>Datalake</a:t>
-            </a:r>
-            <a:r>
-              <a:rPr lang="en-US" sz="800" dirty="0">
-                <a:latin typeface="Arial" panose="020B0604020202020204" pitchFamily="34" charset="0"/>
-                <a:cs typeface="Arial" panose="020B0604020202020204" pitchFamily="34" charset="0"/>
-              </a:rPr>
-              <a:t> Formation</a:t>
+              <a:t>S&amp;P 500 Data lake Formation</a:t>
             </a:r>
           </a:p>
           <a:p>
@@ -4117,21 +4103,7 @@
                 <a:latin typeface="Arial" panose="020B0604020202020204" pitchFamily="34" charset="0"/>
                 <a:cs typeface="Arial" panose="020B0604020202020204" pitchFamily="34" charset="0"/>
               </a:rPr>
-              <a:t>ETL on </a:t>
-            </a:r>
-            <a:r>
-              <a:rPr lang="en-US" sz="800" dirty="0" err="1">
-                <a:latin typeface="Arial" panose="020B0604020202020204" pitchFamily="34" charset="0"/>
-                <a:cs typeface="Arial" panose="020B0604020202020204" pitchFamily="34" charset="0"/>
-              </a:rPr>
-              <a:t>gdelt</a:t>
-            </a:r>
-            <a:r>
-              <a:rPr lang="en-US" sz="800" dirty="0">
-                <a:latin typeface="Arial" panose="020B0604020202020204" pitchFamily="34" charset="0"/>
-                <a:cs typeface="Arial" panose="020B0604020202020204" pitchFamily="34" charset="0"/>
-              </a:rPr>
-              <a:t> open data</a:t>
+              <a:t>ETL on gdelt open data</a:t>
             </a:r>
           </a:p>
           <a:p>
@@ -4210,8 +4182,8 @@
         </p:nvSpPr>
         <p:spPr>
           <a:xfrm>
-            <a:off x="49636" y="6383831"/>
-            <a:ext cx="1188974" cy="369332"/>
+            <a:off x="49636" y="6537719"/>
+            <a:ext cx="1188974" cy="215444"/>
           </a:xfrm>
           <a:prstGeom prst="rect">
             <a:avLst/>
@@ -4244,7 +4216,7 @@
           <a:p>
             <a:pPr algn="ctr"/>
             <a:r>
-              <a:rPr lang="en-US" sz="900" dirty="0">
+              <a:rPr lang="en-US" sz="800" dirty="0">
                 <a:ln w="0"/>
                 <a:solidFill>
                   <a:schemeClr val="accent1"/>
@@ -4256,8 +4228,10 @@
                     </a:srgbClr>
                   </a:outerShdw>
                 </a:effectLst>
+                <a:latin typeface="Arial" panose="020B0604020202020204" pitchFamily="34" charset="0"/>
+                <a:cs typeface="Arial" panose="020B0604020202020204" pitchFamily="34" charset="0"/>
               </a:rPr>
-              <a:t>External Data Sources </a:t>
+              <a:t>Data Ingestion Layer</a:t>
             </a:r>
           </a:p>
         </p:txBody>
@@ -4291,7 +4265,7 @@
         </p:blipFill>
         <p:spPr bwMode="auto">
           <a:xfrm>
-            <a:off x="150534" y="1424932"/>
+            <a:off x="150534" y="573164"/>
             <a:ext cx="1088077" cy="618226"/>
           </a:xfrm>
           <a:prstGeom prst="rect">
@@ -4331,7 +4305,7 @@
         </p:blipFill>
         <p:spPr>
           <a:xfrm>
-            <a:off x="396572" y="3159517"/>
+            <a:off x="396572" y="2307749"/>
             <a:ext cx="624385" cy="606052"/>
           </a:xfrm>
           <a:prstGeom prst="rect">
@@ -4368,7 +4342,7 @@
         </p:blipFill>
         <p:spPr bwMode="auto">
           <a:xfrm>
-            <a:off x="349267" y="3855662"/>
+            <a:off x="349267" y="3003894"/>
             <a:ext cx="764078" cy="764078"/>
           </a:xfrm>
           <a:prstGeom prst="rect">
@@ -4415,7 +4389,7 @@
         </p:blipFill>
         <p:spPr bwMode="auto">
           <a:xfrm>
-            <a:off x="396572" y="4709833"/>
+            <a:off x="396572" y="3858065"/>
             <a:ext cx="697006" cy="697006"/>
           </a:xfrm>
           <a:prstGeom prst="rect">
@@ -4462,7 +4436,7 @@
         </p:blipFill>
         <p:spPr bwMode="auto">
           <a:xfrm>
-            <a:off x="11077699" y="2127230"/>
+            <a:off x="11077699" y="1532245"/>
             <a:ext cx="762000" cy="762000"/>
           </a:xfrm>
           <a:prstGeom prst="rect">
@@ -4554,8 +4528,8 @@
         </p:nvSpPr>
         <p:spPr>
           <a:xfrm>
-            <a:off x="10885298" y="6370152"/>
-            <a:ext cx="1146801" cy="369332"/>
+            <a:off x="10735994" y="6524901"/>
+            <a:ext cx="1445404" cy="215444"/>
           </a:xfrm>
           <a:prstGeom prst="rect">
             <a:avLst/>
@@ -4588,7 +4562,7 @@
           <a:p>
             <a:pPr algn="ctr"/>
             <a:r>
-              <a:rPr lang="en-US" sz="900" dirty="0">
+              <a:rPr lang="en-US" sz="800" dirty="0">
                 <a:ln w="0"/>
                 <a:solidFill>
                   <a:schemeClr val="accent1"/>
@@ -4600,6 +4574,8 @@
                     </a:srgbClr>
                   </a:outerShdw>
                 </a:effectLst>
+                <a:latin typeface="Arial" panose="020B0604020202020204" pitchFamily="34" charset="0"/>
+                <a:cs typeface="Arial" panose="020B0604020202020204" pitchFamily="34" charset="0"/>
               </a:rPr>
               <a:t>Data Consumption Layer</a:t>
             </a:r>
@@ -4620,8 +4596,8 @@
         </p:nvSpPr>
         <p:spPr>
           <a:xfrm>
-            <a:off x="8570555" y="3044101"/>
-            <a:ext cx="2013465" cy="230832"/>
+            <a:off x="8575793" y="3030287"/>
+            <a:ext cx="2013465" cy="215444"/>
           </a:xfrm>
           <a:prstGeom prst="rect">
             <a:avLst/>
@@ -4654,7 +4630,7 @@
           <a:p>
             <a:pPr algn="ctr"/>
             <a:r>
-              <a:rPr lang="en-US" sz="900" dirty="0">
+              <a:rPr lang="en-US" sz="800" dirty="0">
                 <a:ln w="0"/>
                 <a:solidFill>
                   <a:schemeClr val="accent1"/>
@@ -4666,8 +4642,39 @@
                     </a:srgbClr>
                   </a:outerShdw>
                 </a:effectLst>
+                <a:latin typeface="Arial" panose="020B0604020202020204" pitchFamily="34" charset="0"/>
+                <a:cs typeface="Arial" panose="020B0604020202020204" pitchFamily="34" charset="0"/>
               </a:rPr>
-              <a:t>Realtime/NRT Processing Layer</a:t>
+              <a:t>Realtime/NRT </a:t>
+            </a:r>
+            <a:r>
+              <a:rPr lang="en-US" sz="800" dirty="0">
+                <a:ln w="0"/>
+                <a:solidFill>
+                  <a:schemeClr val="accent1"/>
+                </a:solidFill>
+                <a:latin typeface="Arial" panose="020B0604020202020204" pitchFamily="34" charset="0"/>
+                <a:cs typeface="Arial" panose="020B0604020202020204" pitchFamily="34" charset="0"/>
+              </a:rPr>
+              <a:t>Processing</a:t>
+            </a:r>
+            <a:r>
+              <a:rPr lang="en-US" sz="800" dirty="0">
+                <a:ln w="0"/>
+                <a:solidFill>
+                  <a:schemeClr val="accent1"/>
+                </a:solidFill>
+                <a:effectLst>
+                  <a:outerShdw blurRad="38100" dist="25400" dir="5400000" algn="ctr" rotWithShape="0">
+                    <a:srgbClr val="6E747A">
+                      <a:alpha val="43000"/>
+                    </a:srgbClr>
+                  </a:outerShdw>
+                </a:effectLst>
+                <a:latin typeface="Arial" panose="020B0604020202020204" pitchFamily="34" charset="0"/>
+                <a:cs typeface="Arial" panose="020B0604020202020204" pitchFamily="34" charset="0"/>
+              </a:rPr>
+              <a:t> Layer</a:t>
             </a:r>
           </a:p>
         </p:txBody>
@@ -4686,8 +4693,8 @@
         </p:nvSpPr>
         <p:spPr>
           <a:xfrm>
-            <a:off x="8579833" y="3313584"/>
-            <a:ext cx="2013465" cy="230832"/>
+            <a:off x="8583014" y="3328972"/>
+            <a:ext cx="2013465" cy="215444"/>
           </a:xfrm>
           <a:prstGeom prst="rect">
             <a:avLst/>
@@ -4720,7 +4727,7 @@
           <a:p>
             <a:pPr algn="ctr"/>
             <a:r>
-              <a:rPr lang="en-US" sz="900" dirty="0">
+              <a:rPr lang="en-US" sz="800" dirty="0">
                 <a:ln w="0"/>
                 <a:solidFill>
                   <a:schemeClr val="accent1"/>
@@ -4732,8 +4739,39 @@
                     </a:srgbClr>
                   </a:outerShdw>
                 </a:effectLst>
+                <a:latin typeface="Arial" panose="020B0604020202020204" pitchFamily="34" charset="0"/>
+                <a:cs typeface="Arial" panose="020B0604020202020204" pitchFamily="34" charset="0"/>
               </a:rPr>
-              <a:t>Batch/Analytics Processing Layer</a:t>
+              <a:t>Batch/</a:t>
+            </a:r>
+            <a:r>
+              <a:rPr lang="en-US" sz="800" dirty="0">
+                <a:ln w="0"/>
+                <a:solidFill>
+                  <a:schemeClr val="accent1"/>
+                </a:solidFill>
+                <a:latin typeface="Arial" panose="020B0604020202020204" pitchFamily="34" charset="0"/>
+                <a:cs typeface="Arial" panose="020B0604020202020204" pitchFamily="34" charset="0"/>
+              </a:rPr>
+              <a:t>Analytics</a:t>
+            </a:r>
+            <a:r>
+              <a:rPr lang="en-US" sz="800" dirty="0">
+                <a:ln w="0"/>
+                <a:solidFill>
+                  <a:schemeClr val="accent1"/>
+                </a:solidFill>
+                <a:effectLst>
+                  <a:outerShdw blurRad="38100" dist="25400" dir="5400000" algn="ctr" rotWithShape="0">
+                    <a:srgbClr val="6E747A">
+                      <a:alpha val="43000"/>
+                    </a:srgbClr>
+                  </a:outerShdw>
+                </a:effectLst>
+                <a:latin typeface="Arial" panose="020B0604020202020204" pitchFamily="34" charset="0"/>
+                <a:cs typeface="Arial" panose="020B0604020202020204" pitchFamily="34" charset="0"/>
+              </a:rPr>
+              <a:t> Processing Layer</a:t>
             </a:r>
           </a:p>
         </p:txBody>
@@ -4752,8 +4790,8 @@
         </p:nvSpPr>
         <p:spPr>
           <a:xfrm>
-            <a:off x="10794531" y="2901204"/>
-            <a:ext cx="1328333" cy="215444"/>
+            <a:off x="10951930" y="2285654"/>
+            <a:ext cx="939601" cy="215444"/>
           </a:xfrm>
           <a:prstGeom prst="rect">
             <a:avLst/>
@@ -4807,7 +4845,7 @@
         </p:blipFill>
         <p:spPr bwMode="auto">
           <a:xfrm>
-            <a:off x="11077699" y="3486132"/>
+            <a:off x="11077699" y="2891147"/>
             <a:ext cx="762000" cy="762000"/>
           </a:xfrm>
           <a:prstGeom prst="rect">
@@ -4854,8 +4892,8 @@
         </p:nvSpPr>
         <p:spPr bwMode="auto">
           <a:xfrm>
-            <a:off x="10885295" y="4268414"/>
-            <a:ext cx="1146802" cy="338554"/>
+            <a:off x="11058827" y="3666590"/>
+            <a:ext cx="876912" cy="338554"/>
           </a:xfrm>
           <a:prstGeom prst="rect">
             <a:avLst/>
@@ -5047,7 +5085,7 @@
         </p:blipFill>
         <p:spPr bwMode="auto">
           <a:xfrm>
-            <a:off x="11077699" y="978020"/>
+            <a:off x="11077699" y="383035"/>
             <a:ext cx="762000" cy="762000"/>
           </a:xfrm>
           <a:prstGeom prst="rect">
@@ -5092,8 +5130,8 @@
         </p:nvSpPr>
         <p:spPr>
           <a:xfrm>
-            <a:off x="10794530" y="1717428"/>
-            <a:ext cx="1328333" cy="215444"/>
+            <a:off x="11020240" y="1135799"/>
+            <a:ext cx="876912" cy="215444"/>
           </a:xfrm>
           <a:prstGeom prst="rect">
             <a:avLst/>
@@ -5207,7 +5245,7 @@
         </p:blipFill>
         <p:spPr bwMode="auto">
           <a:xfrm>
-            <a:off x="2154816" y="2877682"/>
+            <a:off x="1484675" y="2877682"/>
             <a:ext cx="762000" cy="762000"/>
           </a:xfrm>
           <a:prstGeom prst="rect">
@@ -5428,7 +5466,7 @@
         </p:blipFill>
         <p:spPr bwMode="auto">
           <a:xfrm>
-            <a:off x="6035055" y="5186386"/>
+            <a:off x="6899349" y="5186386"/>
             <a:ext cx="457200" cy="457200"/>
           </a:xfrm>
           <a:prstGeom prst="rect">
@@ -5475,8 +5513,8 @@
         </p:nvSpPr>
         <p:spPr bwMode="auto">
           <a:xfrm>
-            <a:off x="6406867" y="5307123"/>
-            <a:ext cx="1533416" cy="276999"/>
+            <a:off x="6547146" y="5613169"/>
+            <a:ext cx="1230858" cy="215444"/>
           </a:xfrm>
           <a:prstGeom prst="rect">
             <a:avLst/>
@@ -5610,7 +5648,7 @@
           <a:p>
             <a:pPr eaLnBrk="1" hangingPunct="1"/>
             <a:r>
-              <a:rPr lang="en-US" altLang="en-US" sz="1200" dirty="0">
+              <a:rPr lang="en-US" altLang="en-US" sz="800" dirty="0">
                 <a:latin typeface="Arial" panose="020B0604020202020204" pitchFamily="34" charset="0"/>
                 <a:ea typeface="Amazon Ember" panose="020B0603020204020204" pitchFamily="34" charset="0"/>
                 <a:cs typeface="Arial" panose="020B0604020202020204" pitchFamily="34" charset="0"/>
@@ -5634,10 +5672,10 @@
         </p:nvGrpSpPr>
         <p:grpSpPr>
           <a:xfrm>
-            <a:off x="3819181" y="2833861"/>
-            <a:ext cx="1805128" cy="1102652"/>
-            <a:chOff x="3923039" y="4101353"/>
-            <a:chExt cx="1805128" cy="1102652"/>
+            <a:off x="3900755" y="2886878"/>
+            <a:ext cx="2040002" cy="1102652"/>
+            <a:chOff x="4004613" y="4154370"/>
+            <a:chExt cx="2040002" cy="1102652"/>
           </a:xfrm>
         </p:grpSpPr>
         <p:sp>
@@ -5654,7 +5692,7 @@
           </p:nvSpPr>
           <p:spPr>
             <a:xfrm>
-              <a:off x="3923039" y="4101353"/>
+              <a:off x="4239487" y="4154370"/>
               <a:ext cx="1805128" cy="1102652"/>
             </a:xfrm>
             <a:prstGeom prst="rect">
@@ -5680,7 +5718,10 @@
             <a:lstStyle/>
             <a:p>
               <a:pPr algn="ctr"/>
-              <a:endParaRPr lang="en-US"/>
+              <a:endParaRPr lang="en-US" sz="800">
+                <a:latin typeface="Arial" panose="020B0604020202020204" pitchFamily="34" charset="0"/>
+                <a:cs typeface="Arial" panose="020B0604020202020204" pitchFamily="34" charset="0"/>
+              </a:endParaRPr>
             </a:p>
           </p:txBody>
         </p:sp>
@@ -5704,8 +5745,21 @@
             <a:prstGeom prst="rect">
               <a:avLst/>
             </a:prstGeom>
-            <a:noFill/>
           </p:spPr>
+          <p:style>
+            <a:lnRef idx="2">
+              <a:schemeClr val="accent1"/>
+            </a:lnRef>
+            <a:fillRef idx="1">
+              <a:schemeClr val="lt1"/>
+            </a:fillRef>
+            <a:effectRef idx="0">
+              <a:schemeClr val="accent1"/>
+            </a:effectRef>
+            <a:fontRef idx="minor">
+              <a:schemeClr val="dk1"/>
+            </a:fontRef>
+          </p:style>
           <p:txBody>
             <a:bodyPr wrap="square">
               <a:spAutoFit/>
@@ -5759,30 +5813,22 @@
             <a:prstGeom prst="rect">
               <a:avLst/>
             </a:prstGeom>
-            <a:noFill/>
-            <a:ln>
-              <a:noFill/>
-            </a:ln>
-            <a:extLst>
-              <a:ext uri="{909E8E84-426E-40DD-AFC4-6F175D3DCCD1}">
-                <a14:hiddenFill xmlns:a14="http://schemas.microsoft.com/office/drawing/2010/main">
-                  <a:solidFill>
-                    <a:srgbClr val="FFFFFF"/>
-                  </a:solidFill>
-                </a14:hiddenFill>
-              </a:ext>
-              <a:ext uri="{91240B29-F687-4F45-9708-019B960494DF}">
-                <a14:hiddenLine xmlns:a14="http://schemas.microsoft.com/office/drawing/2010/main" w="9525">
-                  <a:solidFill>
-                    <a:srgbClr val="000000"/>
-                  </a:solidFill>
-                  <a:miter lim="800000"/>
-                  <a:headEnd/>
-                  <a:tailEnd/>
-                </a14:hiddenLine>
-              </a:ext>
-            </a:extLst>
+            <a:ln/>
           </p:spPr>
+          <p:style>
+            <a:lnRef idx="2">
+              <a:schemeClr val="accent1"/>
+            </a:lnRef>
+            <a:fillRef idx="1">
+              <a:schemeClr val="lt1"/>
+            </a:fillRef>
+            <a:effectRef idx="0">
+              <a:schemeClr val="accent1"/>
+            </a:effectRef>
+            <a:fontRef idx="minor">
+              <a:schemeClr val="dk1"/>
+            </a:fontRef>
+          </p:style>
         </p:pic>
         <p:pic>
           <p:nvPicPr>
@@ -5819,30 +5865,22 @@
             <a:prstGeom prst="rect">
               <a:avLst/>
             </a:prstGeom>
-            <a:noFill/>
-            <a:ln>
-              <a:noFill/>
-            </a:ln>
-            <a:extLst>
-              <a:ext uri="{909E8E84-426E-40DD-AFC4-6F175D3DCCD1}">
-                <a14:hiddenFill xmlns:a14="http://schemas.microsoft.com/office/drawing/2010/main">
-                  <a:solidFill>
-                    <a:srgbClr val="FFFFFF"/>
-                  </a:solidFill>
-                </a14:hiddenFill>
-              </a:ext>
-              <a:ext uri="{91240B29-F687-4F45-9708-019B960494DF}">
-                <a14:hiddenLine xmlns:a14="http://schemas.microsoft.com/office/drawing/2010/main" w="9525">
-                  <a:solidFill>
-                    <a:srgbClr val="000000"/>
-                  </a:solidFill>
-                  <a:miter lim="800000"/>
-                  <a:headEnd/>
-                  <a:tailEnd/>
-                </a14:hiddenLine>
-              </a:ext>
-            </a:extLst>
+            <a:ln/>
           </p:spPr>
+          <p:style>
+            <a:lnRef idx="2">
+              <a:schemeClr val="accent1"/>
+            </a:lnRef>
+            <a:fillRef idx="1">
+              <a:schemeClr val="lt1"/>
+            </a:fillRef>
+            <a:effectRef idx="0">
+              <a:schemeClr val="accent1"/>
+            </a:effectRef>
+            <a:fontRef idx="minor">
+              <a:schemeClr val="dk1"/>
+            </a:fontRef>
+          </p:style>
         </p:pic>
         <p:sp>
           <p:nvSpPr>
@@ -5864,8 +5902,21 @@
             <a:prstGeom prst="rect">
               <a:avLst/>
             </a:prstGeom>
-            <a:noFill/>
           </p:spPr>
+          <p:style>
+            <a:lnRef idx="2">
+              <a:schemeClr val="accent1"/>
+            </a:lnRef>
+            <a:fillRef idx="1">
+              <a:schemeClr val="lt1"/>
+            </a:fillRef>
+            <a:effectRef idx="0">
+              <a:schemeClr val="accent1"/>
+            </a:effectRef>
+            <a:fontRef idx="minor">
+              <a:schemeClr val="dk1"/>
+            </a:fontRef>
+          </p:style>
           <p:txBody>
             <a:bodyPr wrap="square">
               <a:spAutoFit/>
@@ -5919,30 +5970,22 @@
             <a:prstGeom prst="rect">
               <a:avLst/>
             </a:prstGeom>
-            <a:noFill/>
-            <a:ln>
-              <a:noFill/>
-            </a:ln>
-            <a:extLst>
-              <a:ext uri="{909E8E84-426E-40DD-AFC4-6F175D3DCCD1}">
-                <a14:hiddenFill xmlns:a14="http://schemas.microsoft.com/office/drawing/2010/main">
-                  <a:solidFill>
-                    <a:srgbClr val="FFFFFF"/>
-                  </a:solidFill>
-                </a14:hiddenFill>
-              </a:ext>
-              <a:ext uri="{91240B29-F687-4F45-9708-019B960494DF}">
-                <a14:hiddenLine xmlns:a14="http://schemas.microsoft.com/office/drawing/2010/main" w="9525">
-                  <a:solidFill>
-                    <a:srgbClr val="000000"/>
-                  </a:solidFill>
-                  <a:miter lim="800000"/>
-                  <a:headEnd/>
-                  <a:tailEnd/>
-                </a14:hiddenLine>
-              </a:ext>
-            </a:extLst>
+            <a:ln/>
           </p:spPr>
+          <p:style>
+            <a:lnRef idx="2">
+              <a:schemeClr val="accent1"/>
+            </a:lnRef>
+            <a:fillRef idx="1">
+              <a:schemeClr val="lt1"/>
+            </a:fillRef>
+            <a:effectRef idx="0">
+              <a:schemeClr val="accent1"/>
+            </a:effectRef>
+            <a:fontRef idx="minor">
+              <a:schemeClr val="dk1"/>
+            </a:fontRef>
+          </p:style>
         </p:pic>
         <p:sp>
           <p:nvSpPr>
@@ -5964,8 +6007,21 @@
             <a:prstGeom prst="rect">
               <a:avLst/>
             </a:prstGeom>
-            <a:noFill/>
           </p:spPr>
+          <p:style>
+            <a:lnRef idx="2">
+              <a:schemeClr val="accent1"/>
+            </a:lnRef>
+            <a:fillRef idx="1">
+              <a:schemeClr val="lt1"/>
+            </a:fillRef>
+            <a:effectRef idx="0">
+              <a:schemeClr val="accent1"/>
+            </a:effectRef>
+            <a:fontRef idx="minor">
+              <a:schemeClr val="dk1"/>
+            </a:fontRef>
+          </p:style>
           <p:txBody>
             <a:bodyPr wrap="square">
               <a:spAutoFit/>
@@ -6014,7 +6070,7 @@
         </p:blipFill>
         <p:spPr bwMode="auto">
           <a:xfrm>
-            <a:off x="3015913" y="2227583"/>
+            <a:off x="2941730" y="1606152"/>
             <a:ext cx="259691" cy="259691"/>
           </a:xfrm>
           <a:prstGeom prst="rect">
@@ -6059,7 +6115,7 @@
         </p:nvSpPr>
         <p:spPr>
           <a:xfrm>
-            <a:off x="3271394" y="2086349"/>
+            <a:off x="3197783" y="1626323"/>
             <a:ext cx="1137696" cy="215444"/>
           </a:xfrm>
           <a:prstGeom prst="rect">
@@ -6101,16 +6157,13 @@
         </p:nvCxnSpPr>
         <p:spPr>
           <a:xfrm rot="5400000" flipH="1" flipV="1">
-            <a:off x="2515738" y="2377508"/>
-            <a:ext cx="520253" cy="480097"/>
+            <a:off x="1832860" y="1768813"/>
+            <a:ext cx="1141684" cy="1076055"/>
           </a:xfrm>
           <a:prstGeom prst="curvedConnector2">
             <a:avLst/>
           </a:prstGeom>
-          <a:ln w="12700">
-            <a:solidFill>
-              <a:schemeClr val="tx2"/>
-            </a:solidFill>
+          <a:ln>
             <a:headEnd type="none" w="med" len="sm"/>
             <a:tailEnd type="arrow" w="med" len="sm"/>
           </a:ln>
@@ -6144,8 +6197,8 @@
         </p:nvSpPr>
         <p:spPr>
           <a:xfrm>
-            <a:off x="2127832" y="2555939"/>
-            <a:ext cx="1199367" cy="215444"/>
+            <a:off x="1679155" y="1581493"/>
+            <a:ext cx="707245" cy="461665"/>
           </a:xfrm>
           <a:prstGeom prst="rect">
             <a:avLst/>
@@ -6163,7 +6216,25 @@
                 <a:latin typeface="Arial" panose="020B0604020202020204" pitchFamily="34" charset="0"/>
                 <a:cs typeface="Arial" panose="020B0604020202020204" pitchFamily="34" charset="0"/>
               </a:rPr>
-              <a:t>SNS Push Notification</a:t>
+              <a:t>SNS Push</a:t>
+            </a:r>
+          </a:p>
+          <a:p>
+            <a:r>
+              <a:rPr lang="en-US" sz="800" dirty="0">
+                <a:latin typeface="Arial" panose="020B0604020202020204" pitchFamily="34" charset="0"/>
+                <a:cs typeface="Arial" panose="020B0604020202020204" pitchFamily="34" charset="0"/>
+              </a:rPr>
+              <a:t>Notification</a:t>
+            </a:r>
+          </a:p>
+          <a:p>
+            <a:r>
+              <a:rPr lang="en-US" sz="800" dirty="0">
+                <a:latin typeface="Arial" panose="020B0604020202020204" pitchFamily="34" charset="0"/>
+                <a:cs typeface="Arial" panose="020B0604020202020204" pitchFamily="34" charset="0"/>
+              </a:rPr>
+              <a:t>/ Scheduler</a:t>
             </a:r>
           </a:p>
         </p:txBody>
@@ -6179,23 +6250,22 @@
           </p:cNvPr>
           <p:cNvCxnSpPr>
             <a:cxnSpLocks/>
-            <a:stCxn id="54" idx="3"/>
-            <a:endCxn id="22" idx="0"/>
+            <a:stCxn id="54" idx="2"/>
+            <a:endCxn id="8" idx="0"/>
           </p:cNvCxnSpPr>
           <p:nvPr/>
         </p:nvCxnSpPr>
         <p:spPr>
-          <a:xfrm>
-            <a:off x="3275604" y="2357429"/>
-            <a:ext cx="1446141" cy="476432"/>
-          </a:xfrm>
-          <a:prstGeom prst="curvedConnector2">
-            <a:avLst/>
+          <a:xfrm rot="16200000" flipH="1">
+            <a:off x="2429293" y="2508126"/>
+            <a:ext cx="1317876" cy="33310"/>
+          </a:xfrm>
+          <a:prstGeom prst="curvedConnector3">
+            <a:avLst>
+              <a:gd name="adj1" fmla="val 50000"/>
+            </a:avLst>
           </a:prstGeom>
-          <a:ln w="12700">
-            <a:solidFill>
-              <a:schemeClr val="tx2"/>
-            </a:solidFill>
+          <a:ln>
             <a:headEnd type="none" w="med" len="sm"/>
             <a:tailEnd type="arrow" w="med" len="sm"/>
           </a:ln>
@@ -6226,25 +6296,20 @@
           </p:cNvPr>
           <p:cNvCxnSpPr>
             <a:cxnSpLocks/>
-            <a:stCxn id="51" idx="3"/>
+            <a:stCxn id="22" idx="0"/>
             <a:endCxn id="42" idx="1"/>
           </p:cNvCxnSpPr>
           <p:nvPr/>
         </p:nvCxnSpPr>
         <p:spPr>
-          <a:xfrm flipV="1">
-            <a:off x="5624309" y="1738097"/>
-            <a:ext cx="1005069" cy="1370547"/>
-          </a:xfrm>
-          <a:prstGeom prst="bentConnector3">
-            <a:avLst>
-              <a:gd name="adj1" fmla="val 50000"/>
-            </a:avLst>
+          <a:xfrm rot="5400000" flipH="1" flipV="1">
+            <a:off x="5259395" y="1516896"/>
+            <a:ext cx="1148781" cy="1591185"/>
+          </a:xfrm>
+          <a:prstGeom prst="bentConnector2">
+            <a:avLst/>
           </a:prstGeom>
-          <a:ln w="12700">
-            <a:solidFill>
-              <a:schemeClr val="tx2"/>
-            </a:solidFill>
+          <a:ln>
             <a:headEnd type="none" w="med" len="sm"/>
             <a:tailEnd type="arrow" w="med" len="sm"/>
           </a:ln>
@@ -6281,9 +6346,9 @@
           <p:nvPr/>
         </p:nvCxnSpPr>
         <p:spPr>
-          <a:xfrm>
-            <a:off x="4721745" y="3936513"/>
-            <a:ext cx="5486" cy="318427"/>
+          <a:xfrm flipH="1">
+            <a:off x="5027855" y="3989530"/>
+            <a:ext cx="10338" cy="265410"/>
           </a:xfrm>
           <a:prstGeom prst="straightConnector1">
             <a:avLst/>
@@ -6326,8 +6391,8 @@
         </p:nvCxnSpPr>
         <p:spPr>
           <a:xfrm flipV="1">
-            <a:off x="5350160" y="2833861"/>
-            <a:ext cx="1599888" cy="1811730"/>
+            <a:off x="5650784" y="2833861"/>
+            <a:ext cx="1299264" cy="1811730"/>
           </a:xfrm>
           <a:prstGeom prst="bentConnector2">
             <a:avLst/>
@@ -6400,8 +6465,8 @@
         </p:nvSpPr>
         <p:spPr>
           <a:xfrm>
-            <a:off x="7004103" y="3629851"/>
-            <a:ext cx="307777" cy="1438855"/>
+            <a:off x="7094449" y="4527985"/>
+            <a:ext cx="874148" cy="461665"/>
           </a:xfrm>
           <a:prstGeom prst="rect">
             <a:avLst/>
@@ -6409,7 +6474,7 @@
           <a:noFill/>
         </p:spPr>
         <p:txBody>
-          <a:bodyPr vert="vert270" wrap="none" rtlCol="0">
+          <a:bodyPr vert="horz" wrap="square" rtlCol="0">
             <a:spAutoFit/>
           </a:bodyPr>
           <a:lstStyle/>
@@ -6419,51 +6484,20 @@
                 <a:latin typeface="Arial" panose="020B0604020202020204" pitchFamily="34" charset="0"/>
                 <a:cs typeface="Arial" panose="020B0604020202020204" pitchFamily="34" charset="0"/>
               </a:rPr>
-              <a:t>Model Development Lifecycle</a:t>
-            </a:r>
-          </a:p>
-        </p:txBody>
-      </p:sp>
-      <p:cxnSp>
-        <p:nvCxnSpPr>
-          <p:cNvPr id="89" name="Straight Connector 88">
-            <a:extLst>
-              <a:ext uri="{FF2B5EF4-FFF2-40B4-BE49-F238E27FC236}">
-                <a16:creationId xmlns:a16="http://schemas.microsoft.com/office/drawing/2014/main" id="{B5928D89-FEBC-4FFD-B672-37FF8AF1A530}"/>
-              </a:ext>
-            </a:extLst>
-          </p:cNvPr>
-          <p:cNvCxnSpPr>
-            <a:cxnSpLocks/>
-            <a:stCxn id="54" idx="0"/>
-            <a:endCxn id="42" idx="1"/>
-          </p:cNvCxnSpPr>
-          <p:nvPr/>
-        </p:nvCxnSpPr>
-        <p:spPr>
-          <a:xfrm rot="5400000" flipH="1" flipV="1">
-            <a:off x="4642825" y="241031"/>
-            <a:ext cx="489486" cy="3483619"/>
-          </a:xfrm>
-          <a:prstGeom prst="bentConnector2">
-            <a:avLst/>
-          </a:prstGeom>
-        </p:spPr>
-        <p:style>
-          <a:lnRef idx="1">
-            <a:schemeClr val="accent1"/>
-          </a:lnRef>
-          <a:fillRef idx="0">
-            <a:schemeClr val="accent1"/>
-          </a:fillRef>
-          <a:effectRef idx="0">
-            <a:schemeClr val="accent1"/>
-          </a:effectRef>
-          <a:fontRef idx="minor">
-            <a:schemeClr val="tx1"/>
-          </a:fontRef>
-        </p:style>
-      </p:cxnSp>
+              <a:t>Model Development </a:t>
+            </a:r>
+          </a:p>
+          <a:p>
+            <a:r>
+              <a:rPr lang="en-US" sz="800" dirty="0">
+                <a:latin typeface="Arial" panose="020B0604020202020204" pitchFamily="34" charset="0"/>
+                <a:cs typeface="Arial" panose="020B0604020202020204" pitchFamily="34" charset="0"/>
+              </a:rPr>
+              <a:t>Lifecycle</a:t>
+            </a:r>
+          </a:p>
+        </p:txBody>
+      </p:sp>
       <p:pic>
         <p:nvPicPr>
           <p:cNvPr id="52" name="Graphic 7">
@@ -6493,7 +6527,7 @@
         </p:blipFill>
         <p:spPr bwMode="auto">
           <a:xfrm>
-            <a:off x="11077699" y="4804854"/>
+            <a:off x="11077699" y="4209869"/>
             <a:ext cx="762000" cy="762000"/>
           </a:xfrm>
           <a:prstGeom prst="rect">
@@ -6540,8 +6574,8 @@
         </p:nvSpPr>
         <p:spPr bwMode="auto">
           <a:xfrm>
-            <a:off x="10885295" y="5647578"/>
-            <a:ext cx="1146802" cy="215444"/>
+            <a:off x="11020239" y="5052593"/>
+            <a:ext cx="1011857" cy="338554"/>
           </a:xfrm>
           <a:prstGeom prst="rect">
             <a:avLst/>
@@ -6722,6 +6756,952 @@
               <a:ea typeface="Amazon Ember" panose="020B0603020204020204" pitchFamily="34" charset="0"/>
               <a:cs typeface="Arial" panose="020B0604020202020204" pitchFamily="34" charset="0"/>
             </a:endParaRPr>
+          </a:p>
+        </p:txBody>
+      </p:sp>
+      <p:sp>
+        <p:nvSpPr>
+          <p:cNvPr id="8" name="Rectangle 7">
+            <a:extLst>
+              <a:ext uri="{FF2B5EF4-FFF2-40B4-BE49-F238E27FC236}">
+                <a16:creationId xmlns:a16="http://schemas.microsoft.com/office/drawing/2014/main" id="{8DA0AE2E-F4E2-4E84-B0D9-99D5E7D98C7E}"/>
+              </a:ext>
+            </a:extLst>
+          </p:cNvPr>
+          <p:cNvSpPr/>
+          <p:nvPr/>
+        </p:nvSpPr>
+        <p:spPr>
+          <a:xfrm>
+            <a:off x="2450366" y="3183719"/>
+            <a:ext cx="1309039" cy="259730"/>
+          </a:xfrm>
+          <a:prstGeom prst="rect">
+            <a:avLst/>
+          </a:prstGeom>
+        </p:spPr>
+        <p:style>
+          <a:lnRef idx="2">
+            <a:schemeClr val="accent1">
+              <a:shade val="50000"/>
+            </a:schemeClr>
+          </a:lnRef>
+          <a:fillRef idx="1">
+            <a:schemeClr val="accent1"/>
+          </a:fillRef>
+          <a:effectRef idx="0">
+            <a:schemeClr val="accent1"/>
+          </a:effectRef>
+          <a:fontRef idx="minor">
+            <a:schemeClr val="lt1"/>
+          </a:fontRef>
+        </p:style>
+        <p:txBody>
+          <a:bodyPr rtlCol="0" anchor="ctr"/>
+          <a:lstStyle/>
+          <a:p>
+            <a:pPr algn="ctr"/>
+            <a:r>
+              <a:rPr lang="en-US" sz="800" dirty="0">
+                <a:latin typeface="Arial" panose="020B0604020202020204" pitchFamily="34" charset="0"/>
+                <a:cs typeface="Arial" panose="020B0604020202020204" pitchFamily="34" charset="0"/>
+              </a:rPr>
+              <a:t>Validation Engine</a:t>
+            </a:r>
+          </a:p>
+        </p:txBody>
+      </p:sp>
+      <p:pic>
+        <p:nvPicPr>
+          <p:cNvPr id="59" name="Picture 2" descr="Project Jupyter | Home">
+            <a:extLst>
+              <a:ext uri="{FF2B5EF4-FFF2-40B4-BE49-F238E27FC236}">
+                <a16:creationId xmlns:a16="http://schemas.microsoft.com/office/drawing/2014/main" id="{54D055F3-C1DF-4205-92C0-F5066374A682}"/>
+              </a:ext>
+            </a:extLst>
+          </p:cNvPr>
+          <p:cNvPicPr>
+            <a:picLocks noChangeAspect="1" noChangeArrowheads="1"/>
+          </p:cNvPicPr>
+          <p:nvPr/>
+        </p:nvPicPr>
+        <p:blipFill>
+          <a:blip r:embed="rId21">
+            <a:extLst>
+              <a:ext uri="{28A0092B-C50C-407E-A947-70E740481C1C}">
+                <a14:useLocalDpi xmlns:a14="http://schemas.microsoft.com/office/drawing/2010/main" val="0"/>
+              </a:ext>
+            </a:extLst>
+          </a:blip>
+          <a:srcRect/>
+          <a:stretch>
+            <a:fillRect/>
+          </a:stretch>
+        </p:blipFill>
+        <p:spPr bwMode="auto">
+          <a:xfrm>
+            <a:off x="10797715" y="5617037"/>
+            <a:ext cx="1270895" cy="546262"/>
+          </a:xfrm>
+          <a:prstGeom prst="rect">
+            <a:avLst/>
+          </a:prstGeom>
+          <a:noFill/>
+          <a:extLst>
+            <a:ext uri="{909E8E84-426E-40DD-AFC4-6F175D3DCCD1}">
+              <a14:hiddenFill xmlns:a14="http://schemas.microsoft.com/office/drawing/2010/main">
+                <a:solidFill>
+                  <a:srgbClr val="FFFFFF"/>
+                </a:solidFill>
+              </a14:hiddenFill>
+            </a:ext>
+          </a:extLst>
+        </p:spPr>
+      </p:pic>
+      <p:cxnSp>
+        <p:nvCxnSpPr>
+          <p:cNvPr id="66" name="Straight Connector 65">
+            <a:extLst>
+              <a:ext uri="{FF2B5EF4-FFF2-40B4-BE49-F238E27FC236}">
+                <a16:creationId xmlns:a16="http://schemas.microsoft.com/office/drawing/2014/main" id="{A8EE82D2-27B7-4B44-9CFC-F603928AA922}"/>
+              </a:ext>
+            </a:extLst>
+          </p:cNvPr>
+          <p:cNvCxnSpPr>
+            <a:cxnSpLocks/>
+            <a:stCxn id="42" idx="3"/>
+            <a:endCxn id="94" idx="7"/>
+          </p:cNvCxnSpPr>
+          <p:nvPr/>
+        </p:nvCxnSpPr>
+        <p:spPr>
+          <a:xfrm>
+            <a:off x="7281575" y="1738097"/>
+            <a:ext cx="1280568" cy="7737"/>
+          </a:xfrm>
+          <a:prstGeom prst="line">
+            <a:avLst/>
+          </a:prstGeom>
+          <a:ln w="9525" cap="flat" cmpd="sng" algn="ctr">
+            <a:solidFill>
+              <a:schemeClr val="accent1"/>
+            </a:solidFill>
+            <a:prstDash val="dash"/>
+            <a:round/>
+            <a:headEnd type="none" w="med" len="med"/>
+            <a:tailEnd type="none" w="med" len="med"/>
+          </a:ln>
+        </p:spPr>
+        <p:style>
+          <a:lnRef idx="0">
+            <a:scrgbClr r="0" g="0" b="0"/>
+          </a:lnRef>
+          <a:fillRef idx="0">
+            <a:scrgbClr r="0" g="0" b="0"/>
+          </a:fillRef>
+          <a:effectRef idx="0">
+            <a:scrgbClr r="0" g="0" b="0"/>
+          </a:effectRef>
+          <a:fontRef idx="minor">
+            <a:schemeClr val="tx1"/>
+          </a:fontRef>
+        </p:style>
+      </p:cxnSp>
+      <p:cxnSp>
+        <p:nvCxnSpPr>
+          <p:cNvPr id="82" name="Straight Connector 81">
+            <a:extLst>
+              <a:ext uri="{FF2B5EF4-FFF2-40B4-BE49-F238E27FC236}">
+                <a16:creationId xmlns:a16="http://schemas.microsoft.com/office/drawing/2014/main" id="{CFFCE916-878E-4CFB-A63D-B2DE1AAC7A2C}"/>
+              </a:ext>
+            </a:extLst>
+          </p:cNvPr>
+          <p:cNvCxnSpPr>
+            <a:cxnSpLocks/>
+            <a:stCxn id="102" idx="2"/>
+          </p:cNvCxnSpPr>
+          <p:nvPr/>
+        </p:nvCxnSpPr>
+        <p:spPr>
+          <a:xfrm flipV="1">
+            <a:off x="10452499" y="793653"/>
+            <a:ext cx="596471" cy="17926"/>
+          </a:xfrm>
+          <a:prstGeom prst="line">
+            <a:avLst/>
+          </a:prstGeom>
+          <a:ln w="9525" cap="flat" cmpd="sng" algn="ctr">
+            <a:solidFill>
+              <a:schemeClr val="accent1"/>
+            </a:solidFill>
+            <a:prstDash val="dash"/>
+            <a:round/>
+            <a:headEnd type="none" w="med" len="med"/>
+            <a:tailEnd type="none" w="med" len="med"/>
+          </a:ln>
+        </p:spPr>
+        <p:style>
+          <a:lnRef idx="0">
+            <a:scrgbClr r="0" g="0" b="0"/>
+          </a:lnRef>
+          <a:fillRef idx="0">
+            <a:scrgbClr r="0" g="0" b="0"/>
+          </a:fillRef>
+          <a:effectRef idx="0">
+            <a:scrgbClr r="0" g="0" b="0"/>
+          </a:effectRef>
+          <a:fontRef idx="minor">
+            <a:schemeClr val="tx1"/>
+          </a:fontRef>
+        </p:style>
+      </p:cxnSp>
+      <p:cxnSp>
+        <p:nvCxnSpPr>
+          <p:cNvPr id="86" name="Straight Connector 85">
+            <a:extLst>
+              <a:ext uri="{FF2B5EF4-FFF2-40B4-BE49-F238E27FC236}">
+                <a16:creationId xmlns:a16="http://schemas.microsoft.com/office/drawing/2014/main" id="{99A2BC0F-8DF4-453B-A1A6-F6099B587119}"/>
+              </a:ext>
+            </a:extLst>
+          </p:cNvPr>
+          <p:cNvCxnSpPr>
+            <a:cxnSpLocks/>
+            <a:stCxn id="46" idx="3"/>
+            <a:endCxn id="112" idx="7"/>
+          </p:cNvCxnSpPr>
+          <p:nvPr/>
+        </p:nvCxnSpPr>
+        <p:spPr>
+          <a:xfrm>
+            <a:off x="7356549" y="5414986"/>
+            <a:ext cx="525558" cy="32467"/>
+          </a:xfrm>
+          <a:prstGeom prst="line">
+            <a:avLst/>
+          </a:prstGeom>
+          <a:ln w="9525" cap="flat" cmpd="sng" algn="ctr">
+            <a:solidFill>
+              <a:schemeClr val="accent1"/>
+            </a:solidFill>
+            <a:prstDash val="dash"/>
+            <a:round/>
+            <a:headEnd type="none" w="med" len="med"/>
+            <a:tailEnd type="none" w="med" len="med"/>
+          </a:ln>
+        </p:spPr>
+        <p:style>
+          <a:lnRef idx="0">
+            <a:scrgbClr r="0" g="0" b="0"/>
+          </a:lnRef>
+          <a:fillRef idx="0">
+            <a:scrgbClr r="0" g="0" b="0"/>
+          </a:fillRef>
+          <a:effectRef idx="0">
+            <a:scrgbClr r="0" g="0" b="0"/>
+          </a:effectRef>
+          <a:fontRef idx="minor">
+            <a:schemeClr val="tx1"/>
+          </a:fontRef>
+        </p:style>
+      </p:cxnSp>
+      <p:sp>
+        <p:nvSpPr>
+          <p:cNvPr id="94" name="Dodecagon 93">
+            <a:extLst>
+              <a:ext uri="{FF2B5EF4-FFF2-40B4-BE49-F238E27FC236}">
+                <a16:creationId xmlns:a16="http://schemas.microsoft.com/office/drawing/2014/main" id="{284F5714-9792-4425-B001-AAC5A1247E2F}"/>
+              </a:ext>
+            </a:extLst>
+          </p:cNvPr>
+          <p:cNvSpPr/>
+          <p:nvPr/>
+        </p:nvSpPr>
+        <p:spPr>
+          <a:xfrm>
+            <a:off x="8562143" y="1592206"/>
+            <a:ext cx="248805" cy="242322"/>
+          </a:xfrm>
+          <a:prstGeom prst="dodecagon">
+            <a:avLst/>
+          </a:prstGeom>
+          <a:solidFill>
+            <a:schemeClr val="accent1">
+              <a:alpha val="50000"/>
+            </a:schemeClr>
+          </a:solidFill>
+          <a:ln>
+            <a:noFill/>
+          </a:ln>
+        </p:spPr>
+        <p:style>
+          <a:lnRef idx="0">
+            <a:scrgbClr r="0" g="0" b="0"/>
+          </a:lnRef>
+          <a:fillRef idx="0">
+            <a:scrgbClr r="0" g="0" b="0"/>
+          </a:fillRef>
+          <a:effectRef idx="0">
+            <a:scrgbClr r="0" g="0" b="0"/>
+          </a:effectRef>
+          <a:fontRef idx="minor">
+            <a:schemeClr val="lt1"/>
+          </a:fontRef>
+        </p:style>
+        <p:txBody>
+          <a:bodyPr rtlCol="0" anchor="ctr"/>
+          <a:lstStyle/>
+          <a:p>
+            <a:pPr algn="ctr"/>
+            <a:r>
+              <a:rPr lang="en-US" sz="800" dirty="0">
+                <a:latin typeface="Arial" panose="020B0604020202020204" pitchFamily="34" charset="0"/>
+                <a:cs typeface="Arial" panose="020B0604020202020204" pitchFamily="34" charset="0"/>
+              </a:rPr>
+              <a:t>A</a:t>
+            </a:r>
+          </a:p>
+        </p:txBody>
+      </p:sp>
+      <p:sp>
+        <p:nvSpPr>
+          <p:cNvPr id="102" name="Dodecagon 101">
+            <a:extLst>
+              <a:ext uri="{FF2B5EF4-FFF2-40B4-BE49-F238E27FC236}">
+                <a16:creationId xmlns:a16="http://schemas.microsoft.com/office/drawing/2014/main" id="{CABF52C9-84EA-4686-967F-F169AEFA9091}"/>
+              </a:ext>
+            </a:extLst>
+          </p:cNvPr>
+          <p:cNvSpPr/>
+          <p:nvPr/>
+        </p:nvSpPr>
+        <p:spPr>
+          <a:xfrm>
+            <a:off x="10203694" y="657951"/>
+            <a:ext cx="248805" cy="242322"/>
+          </a:xfrm>
+          <a:prstGeom prst="dodecagon">
+            <a:avLst/>
+          </a:prstGeom>
+          <a:solidFill>
+            <a:schemeClr val="accent1">
+              <a:alpha val="50000"/>
+            </a:schemeClr>
+          </a:solidFill>
+          <a:ln>
+            <a:noFill/>
+          </a:ln>
+        </p:spPr>
+        <p:style>
+          <a:lnRef idx="0">
+            <a:scrgbClr r="0" g="0" b="0"/>
+          </a:lnRef>
+          <a:fillRef idx="0">
+            <a:scrgbClr r="0" g="0" b="0"/>
+          </a:fillRef>
+          <a:effectRef idx="0">
+            <a:scrgbClr r="0" g="0" b="0"/>
+          </a:effectRef>
+          <a:fontRef idx="minor">
+            <a:schemeClr val="lt1"/>
+          </a:fontRef>
+        </p:style>
+        <p:txBody>
+          <a:bodyPr rtlCol="0" anchor="ctr"/>
+          <a:lstStyle/>
+          <a:p>
+            <a:pPr algn="ctr"/>
+            <a:r>
+              <a:rPr lang="en-US" sz="800" dirty="0">
+                <a:latin typeface="Arial" panose="020B0604020202020204" pitchFamily="34" charset="0"/>
+                <a:cs typeface="Arial" panose="020B0604020202020204" pitchFamily="34" charset="0"/>
+              </a:rPr>
+              <a:t>A</a:t>
+            </a:r>
+          </a:p>
+        </p:txBody>
+      </p:sp>
+      <p:sp>
+        <p:nvSpPr>
+          <p:cNvPr id="112" name="Dodecagon 111">
+            <a:extLst>
+              <a:ext uri="{FF2B5EF4-FFF2-40B4-BE49-F238E27FC236}">
+                <a16:creationId xmlns:a16="http://schemas.microsoft.com/office/drawing/2014/main" id="{9ABD9B5C-0015-4B5E-943E-3E75E870F2DB}"/>
+              </a:ext>
+            </a:extLst>
+          </p:cNvPr>
+          <p:cNvSpPr/>
+          <p:nvPr/>
+        </p:nvSpPr>
+        <p:spPr>
+          <a:xfrm>
+            <a:off x="7882107" y="5293825"/>
+            <a:ext cx="248805" cy="242322"/>
+          </a:xfrm>
+          <a:prstGeom prst="dodecagon">
+            <a:avLst/>
+          </a:prstGeom>
+          <a:solidFill>
+            <a:schemeClr val="accent1">
+              <a:alpha val="50000"/>
+            </a:schemeClr>
+          </a:solidFill>
+          <a:ln>
+            <a:noFill/>
+          </a:ln>
+        </p:spPr>
+        <p:style>
+          <a:lnRef idx="0">
+            <a:scrgbClr r="0" g="0" b="0"/>
+          </a:lnRef>
+          <a:fillRef idx="0">
+            <a:scrgbClr r="0" g="0" b="0"/>
+          </a:fillRef>
+          <a:effectRef idx="0">
+            <a:scrgbClr r="0" g="0" b="0"/>
+          </a:effectRef>
+          <a:fontRef idx="minor">
+            <a:schemeClr val="lt1"/>
+          </a:fontRef>
+        </p:style>
+        <p:txBody>
+          <a:bodyPr rtlCol="0" anchor="ctr"/>
+          <a:lstStyle/>
+          <a:p>
+            <a:pPr algn="ctr"/>
+            <a:r>
+              <a:rPr lang="en-US" sz="800" dirty="0">
+                <a:latin typeface="Arial" panose="020B0604020202020204" pitchFamily="34" charset="0"/>
+                <a:cs typeface="Arial" panose="020B0604020202020204" pitchFamily="34" charset="0"/>
+              </a:rPr>
+              <a:t>B</a:t>
+            </a:r>
+          </a:p>
+        </p:txBody>
+      </p:sp>
+      <p:sp>
+        <p:nvSpPr>
+          <p:cNvPr id="117" name="Dodecagon 116">
+            <a:extLst>
+              <a:ext uri="{FF2B5EF4-FFF2-40B4-BE49-F238E27FC236}">
+                <a16:creationId xmlns:a16="http://schemas.microsoft.com/office/drawing/2014/main" id="{70402BCA-8405-47F8-8DAC-3DC378AD49EC}"/>
+              </a:ext>
+            </a:extLst>
+          </p:cNvPr>
+          <p:cNvSpPr/>
+          <p:nvPr/>
+        </p:nvSpPr>
+        <p:spPr>
+          <a:xfrm>
+            <a:off x="10204080" y="5747225"/>
+            <a:ext cx="248805" cy="242322"/>
+          </a:xfrm>
+          <a:prstGeom prst="dodecagon">
+            <a:avLst/>
+          </a:prstGeom>
+          <a:solidFill>
+            <a:schemeClr val="accent1">
+              <a:alpha val="50000"/>
+            </a:schemeClr>
+          </a:solidFill>
+          <a:ln>
+            <a:noFill/>
+          </a:ln>
+        </p:spPr>
+        <p:style>
+          <a:lnRef idx="0">
+            <a:scrgbClr r="0" g="0" b="0"/>
+          </a:lnRef>
+          <a:fillRef idx="0">
+            <a:scrgbClr r="0" g="0" b="0"/>
+          </a:fillRef>
+          <a:effectRef idx="0">
+            <a:scrgbClr r="0" g="0" b="0"/>
+          </a:effectRef>
+          <a:fontRef idx="minor">
+            <a:schemeClr val="lt1"/>
+          </a:fontRef>
+        </p:style>
+        <p:txBody>
+          <a:bodyPr rtlCol="0" anchor="ctr"/>
+          <a:lstStyle/>
+          <a:p>
+            <a:pPr algn="ctr"/>
+            <a:r>
+              <a:rPr lang="en-US" sz="800" dirty="0">
+                <a:latin typeface="Arial" panose="020B0604020202020204" pitchFamily="34" charset="0"/>
+                <a:cs typeface="Arial" panose="020B0604020202020204" pitchFamily="34" charset="0"/>
+              </a:rPr>
+              <a:t>B</a:t>
+            </a:r>
+          </a:p>
+        </p:txBody>
+      </p:sp>
+      <p:cxnSp>
+        <p:nvCxnSpPr>
+          <p:cNvPr id="118" name="Straight Connector 117">
+            <a:extLst>
+              <a:ext uri="{FF2B5EF4-FFF2-40B4-BE49-F238E27FC236}">
+                <a16:creationId xmlns:a16="http://schemas.microsoft.com/office/drawing/2014/main" id="{8E8CE391-6A35-4916-9429-85EE972BF296}"/>
+              </a:ext>
+            </a:extLst>
+          </p:cNvPr>
+          <p:cNvCxnSpPr>
+            <a:cxnSpLocks/>
+            <a:stCxn id="117" idx="2"/>
+            <a:endCxn id="59" idx="1"/>
+          </p:cNvCxnSpPr>
+          <p:nvPr/>
+        </p:nvCxnSpPr>
+        <p:spPr>
+          <a:xfrm flipV="1">
+            <a:off x="10452885" y="5890168"/>
+            <a:ext cx="344830" cy="10685"/>
+          </a:xfrm>
+          <a:prstGeom prst="line">
+            <a:avLst/>
+          </a:prstGeom>
+          <a:ln w="9525" cap="flat" cmpd="sng" algn="ctr">
+            <a:solidFill>
+              <a:schemeClr val="accent1"/>
+            </a:solidFill>
+            <a:prstDash val="dash"/>
+            <a:round/>
+            <a:headEnd type="none" w="med" len="med"/>
+            <a:tailEnd type="none" w="med" len="med"/>
+          </a:ln>
+        </p:spPr>
+        <p:style>
+          <a:lnRef idx="0">
+            <a:scrgbClr r="0" g="0" b="0"/>
+          </a:lnRef>
+          <a:fillRef idx="0">
+            <a:scrgbClr r="0" g="0" b="0"/>
+          </a:fillRef>
+          <a:effectRef idx="0">
+            <a:scrgbClr r="0" g="0" b="0"/>
+          </a:effectRef>
+          <a:fontRef idx="minor">
+            <a:schemeClr val="tx1"/>
+          </a:fontRef>
+        </p:style>
+      </p:cxnSp>
+      <p:cxnSp>
+        <p:nvCxnSpPr>
+          <p:cNvPr id="123" name="Straight Connector 122">
+            <a:extLst>
+              <a:ext uri="{FF2B5EF4-FFF2-40B4-BE49-F238E27FC236}">
+                <a16:creationId xmlns:a16="http://schemas.microsoft.com/office/drawing/2014/main" id="{BEF4F5C4-F99E-4D09-A833-9852F13D7114}"/>
+              </a:ext>
+            </a:extLst>
+          </p:cNvPr>
+          <p:cNvCxnSpPr>
+            <a:cxnSpLocks/>
+          </p:cNvCxnSpPr>
+          <p:nvPr/>
+        </p:nvCxnSpPr>
+        <p:spPr>
+          <a:xfrm flipV="1">
+            <a:off x="6056743" y="162286"/>
+            <a:ext cx="0" cy="6341424"/>
+          </a:xfrm>
+          <a:prstGeom prst="line">
+            <a:avLst/>
+          </a:prstGeom>
+          <a:ln w="9525" cap="flat" cmpd="sng" algn="ctr">
+            <a:solidFill>
+              <a:schemeClr val="accent1"/>
+            </a:solidFill>
+            <a:prstDash val="dash"/>
+            <a:round/>
+            <a:headEnd type="none" w="med" len="med"/>
+            <a:tailEnd type="none" w="med" len="med"/>
+          </a:ln>
+        </p:spPr>
+        <p:style>
+          <a:lnRef idx="0">
+            <a:scrgbClr r="0" g="0" b="0"/>
+          </a:lnRef>
+          <a:fillRef idx="0">
+            <a:scrgbClr r="0" g="0" b="0"/>
+          </a:fillRef>
+          <a:effectRef idx="0">
+            <a:scrgbClr r="0" g="0" b="0"/>
+          </a:effectRef>
+          <a:fontRef idx="minor">
+            <a:schemeClr val="tx1"/>
+          </a:fontRef>
+        </p:style>
+      </p:cxnSp>
+      <p:sp>
+        <p:nvSpPr>
+          <p:cNvPr id="124" name="TextBox 123">
+            <a:extLst>
+              <a:ext uri="{FF2B5EF4-FFF2-40B4-BE49-F238E27FC236}">
+                <a16:creationId xmlns:a16="http://schemas.microsoft.com/office/drawing/2014/main" id="{3AEF6284-ADCE-4C1A-AD54-128EABECEF55}"/>
+              </a:ext>
+            </a:extLst>
+          </p:cNvPr>
+          <p:cNvSpPr txBox="1"/>
+          <p:nvPr/>
+        </p:nvSpPr>
+        <p:spPr>
+          <a:xfrm>
+            <a:off x="1400896" y="6570206"/>
+            <a:ext cx="4592807" cy="215444"/>
+          </a:xfrm>
+          <a:prstGeom prst="rect">
+            <a:avLst/>
+          </a:prstGeom>
+          <a:ln>
+            <a:solidFill>
+              <a:schemeClr val="bg1"/>
+            </a:solidFill>
+          </a:ln>
+        </p:spPr>
+        <p:style>
+          <a:lnRef idx="2">
+            <a:schemeClr val="dk1"/>
+          </a:lnRef>
+          <a:fillRef idx="1">
+            <a:schemeClr val="lt1"/>
+          </a:fillRef>
+          <a:effectRef idx="0">
+            <a:schemeClr val="dk1"/>
+          </a:effectRef>
+          <a:fontRef idx="minor">
+            <a:schemeClr val="dk1"/>
+          </a:fontRef>
+        </p:style>
+        <p:txBody>
+          <a:bodyPr vert="horz" wrap="square" rtlCol="0" anchor="b">
+            <a:spAutoFit/>
+          </a:bodyPr>
+          <a:lstStyle/>
+          <a:p>
+            <a:pPr algn="ctr"/>
+            <a:r>
+              <a:rPr lang="en-US" sz="800" dirty="0">
+                <a:ln w="0"/>
+                <a:solidFill>
+                  <a:schemeClr val="accent1"/>
+                </a:solidFill>
+                <a:effectLst>
+                  <a:outerShdw blurRad="38100" dist="25400" dir="5400000" algn="ctr" rotWithShape="0">
+                    <a:srgbClr val="6E747A">
+                      <a:alpha val="43000"/>
+                    </a:srgbClr>
+                  </a:outerShdw>
+                </a:effectLst>
+                <a:latin typeface="Arial" panose="020B0604020202020204" pitchFamily="34" charset="0"/>
+                <a:cs typeface="Arial" panose="020B0604020202020204" pitchFamily="34" charset="0"/>
+              </a:rPr>
+              <a:t>Data Storage Layer</a:t>
+            </a:r>
+          </a:p>
+        </p:txBody>
+      </p:sp>
+      <p:sp>
+        <p:nvSpPr>
+          <p:cNvPr id="125" name="TextBox 124">
+            <a:extLst>
+              <a:ext uri="{FF2B5EF4-FFF2-40B4-BE49-F238E27FC236}">
+                <a16:creationId xmlns:a16="http://schemas.microsoft.com/office/drawing/2014/main" id="{EAFC081A-58C0-4F64-81A7-F2234D2F87F9}"/>
+              </a:ext>
+            </a:extLst>
+          </p:cNvPr>
+          <p:cNvSpPr txBox="1"/>
+          <p:nvPr/>
+        </p:nvSpPr>
+        <p:spPr>
+          <a:xfrm>
+            <a:off x="6190014" y="6508423"/>
+            <a:ext cx="4378206" cy="215444"/>
+          </a:xfrm>
+          <a:prstGeom prst="rect">
+            <a:avLst/>
+          </a:prstGeom>
+          <a:ln>
+            <a:solidFill>
+              <a:schemeClr val="bg1"/>
+            </a:solidFill>
+          </a:ln>
+        </p:spPr>
+        <p:style>
+          <a:lnRef idx="2">
+            <a:schemeClr val="dk1"/>
+          </a:lnRef>
+          <a:fillRef idx="1">
+            <a:schemeClr val="lt1"/>
+          </a:fillRef>
+          <a:effectRef idx="0">
+            <a:schemeClr val="dk1"/>
+          </a:effectRef>
+          <a:fontRef idx="minor">
+            <a:schemeClr val="dk1"/>
+          </a:fontRef>
+        </p:style>
+        <p:txBody>
+          <a:bodyPr vert="horz" wrap="square" rtlCol="0" anchor="b">
+            <a:spAutoFit/>
+          </a:bodyPr>
+          <a:lstStyle/>
+          <a:p>
+            <a:pPr algn="ctr"/>
+            <a:r>
+              <a:rPr lang="en-US" sz="800" dirty="0">
+                <a:ln w="0"/>
+                <a:solidFill>
+                  <a:schemeClr val="accent1"/>
+                </a:solidFill>
+                <a:effectLst>
+                  <a:outerShdw blurRad="38100" dist="25400" dir="5400000" algn="ctr" rotWithShape="0">
+                    <a:srgbClr val="6E747A">
+                      <a:alpha val="43000"/>
+                    </a:srgbClr>
+                  </a:outerShdw>
+                </a:effectLst>
+                <a:latin typeface="Arial" panose="020B0604020202020204" pitchFamily="34" charset="0"/>
+                <a:cs typeface="Arial" panose="020B0604020202020204" pitchFamily="34" charset="0"/>
+              </a:rPr>
+              <a:t>Data Usage / Processing Layer</a:t>
+            </a:r>
+          </a:p>
+        </p:txBody>
+      </p:sp>
+      <p:sp>
+        <p:nvSpPr>
+          <p:cNvPr id="126" name="Dodecagon 125">
+            <a:extLst>
+              <a:ext uri="{FF2B5EF4-FFF2-40B4-BE49-F238E27FC236}">
+                <a16:creationId xmlns:a16="http://schemas.microsoft.com/office/drawing/2014/main" id="{7E4CCA1F-6289-448F-9CE1-34F2A0CFC5B0}"/>
+              </a:ext>
+            </a:extLst>
+          </p:cNvPr>
+          <p:cNvSpPr/>
+          <p:nvPr/>
+        </p:nvSpPr>
+        <p:spPr>
+          <a:xfrm>
+            <a:off x="801770" y="5546999"/>
+            <a:ext cx="248805" cy="242322"/>
+          </a:xfrm>
+          <a:prstGeom prst="dodecagon">
+            <a:avLst/>
+          </a:prstGeom>
+          <a:solidFill>
+            <a:schemeClr val="accent1">
+              <a:alpha val="50000"/>
+            </a:schemeClr>
+          </a:solidFill>
+          <a:ln>
+            <a:noFill/>
+          </a:ln>
+        </p:spPr>
+        <p:style>
+          <a:lnRef idx="0">
+            <a:scrgbClr r="0" g="0" b="0"/>
+          </a:lnRef>
+          <a:fillRef idx="0">
+            <a:scrgbClr r="0" g="0" b="0"/>
+          </a:fillRef>
+          <a:effectRef idx="0">
+            <a:scrgbClr r="0" g="0" b="0"/>
+          </a:effectRef>
+          <a:fontRef idx="minor">
+            <a:schemeClr val="lt1"/>
+          </a:fontRef>
+        </p:style>
+        <p:txBody>
+          <a:bodyPr rtlCol="0" anchor="ctr"/>
+          <a:lstStyle/>
+          <a:p>
+            <a:pPr algn="ctr"/>
+            <a:r>
+              <a:rPr lang="en-US" sz="800" dirty="0">
+                <a:latin typeface="Arial" panose="020B0604020202020204" pitchFamily="34" charset="0"/>
+                <a:cs typeface="Arial" panose="020B0604020202020204" pitchFamily="34" charset="0"/>
+              </a:rPr>
+              <a:t>A</a:t>
+            </a:r>
+          </a:p>
+        </p:txBody>
+      </p:sp>
+      <p:sp>
+        <p:nvSpPr>
+          <p:cNvPr id="127" name="Dodecagon 126">
+            <a:extLst>
+              <a:ext uri="{FF2B5EF4-FFF2-40B4-BE49-F238E27FC236}">
+                <a16:creationId xmlns:a16="http://schemas.microsoft.com/office/drawing/2014/main" id="{10CEB6C7-CBBC-4C20-AFB6-58B271C87314}"/>
+              </a:ext>
+            </a:extLst>
+          </p:cNvPr>
+          <p:cNvSpPr/>
+          <p:nvPr/>
+        </p:nvSpPr>
+        <p:spPr>
+          <a:xfrm>
+            <a:off x="801771" y="5843424"/>
+            <a:ext cx="248805" cy="242322"/>
+          </a:xfrm>
+          <a:prstGeom prst="dodecagon">
+            <a:avLst/>
+          </a:prstGeom>
+          <a:solidFill>
+            <a:schemeClr val="accent1">
+              <a:alpha val="50000"/>
+            </a:schemeClr>
+          </a:solidFill>
+          <a:ln>
+            <a:noFill/>
+          </a:ln>
+        </p:spPr>
+        <p:style>
+          <a:lnRef idx="0">
+            <a:scrgbClr r="0" g="0" b="0"/>
+          </a:lnRef>
+          <a:fillRef idx="0">
+            <a:scrgbClr r="0" g="0" b="0"/>
+          </a:fillRef>
+          <a:effectRef idx="0">
+            <a:scrgbClr r="0" g="0" b="0"/>
+          </a:effectRef>
+          <a:fontRef idx="minor">
+            <a:schemeClr val="lt1"/>
+          </a:fontRef>
+        </p:style>
+        <p:txBody>
+          <a:bodyPr rtlCol="0" anchor="ctr"/>
+          <a:lstStyle/>
+          <a:p>
+            <a:pPr algn="ctr"/>
+            <a:r>
+              <a:rPr lang="en-US" sz="800" dirty="0">
+                <a:latin typeface="Arial" panose="020B0604020202020204" pitchFamily="34" charset="0"/>
+                <a:cs typeface="Arial" panose="020B0604020202020204" pitchFamily="34" charset="0"/>
+              </a:rPr>
+              <a:t>B</a:t>
+            </a:r>
+          </a:p>
+        </p:txBody>
+      </p:sp>
+      <p:cxnSp>
+        <p:nvCxnSpPr>
+          <p:cNvPr id="119" name="Straight Connector 118">
+            <a:extLst>
+              <a:ext uri="{FF2B5EF4-FFF2-40B4-BE49-F238E27FC236}">
+                <a16:creationId xmlns:a16="http://schemas.microsoft.com/office/drawing/2014/main" id="{583DF4E6-CB9C-4A82-B685-E787F89722FC}"/>
+              </a:ext>
+            </a:extLst>
+          </p:cNvPr>
+          <p:cNvCxnSpPr/>
+          <p:nvPr/>
+        </p:nvCxnSpPr>
+        <p:spPr>
+          <a:xfrm>
+            <a:off x="150534" y="4989650"/>
+            <a:ext cx="982143" cy="0"/>
+          </a:xfrm>
+          <a:prstGeom prst="line">
+            <a:avLst/>
+          </a:prstGeom>
+          <a:ln w="9525" cap="flat" cmpd="sng" algn="ctr">
+            <a:solidFill>
+              <a:schemeClr val="accent1"/>
+            </a:solidFill>
+            <a:prstDash val="dash"/>
+            <a:round/>
+            <a:headEnd type="none" w="med" len="med"/>
+            <a:tailEnd type="none" w="med" len="med"/>
+          </a:ln>
+        </p:spPr>
+        <p:style>
+          <a:lnRef idx="0">
+            <a:scrgbClr r="0" g="0" b="0"/>
+          </a:lnRef>
+          <a:fillRef idx="0">
+            <a:scrgbClr r="0" g="0" b="0"/>
+          </a:fillRef>
+          <a:effectRef idx="0">
+            <a:scrgbClr r="0" g="0" b="0"/>
+          </a:effectRef>
+          <a:fontRef idx="minor">
+            <a:schemeClr val="tx1"/>
+          </a:fontRef>
+        </p:style>
+      </p:cxnSp>
+      <p:sp>
+        <p:nvSpPr>
+          <p:cNvPr id="120" name="TextBox 119">
+            <a:extLst>
+              <a:ext uri="{FF2B5EF4-FFF2-40B4-BE49-F238E27FC236}">
+                <a16:creationId xmlns:a16="http://schemas.microsoft.com/office/drawing/2014/main" id="{D0511F56-6190-4613-B47F-9626B287F284}"/>
+              </a:ext>
+            </a:extLst>
+          </p:cNvPr>
+          <p:cNvSpPr txBox="1"/>
+          <p:nvPr/>
+        </p:nvSpPr>
+        <p:spPr>
+          <a:xfrm>
+            <a:off x="686869" y="5015792"/>
+            <a:ext cx="529312" cy="215444"/>
+          </a:xfrm>
+          <a:prstGeom prst="rect">
+            <a:avLst/>
+          </a:prstGeom>
+          <a:noFill/>
+        </p:spPr>
+        <p:txBody>
+          <a:bodyPr wrap="none" rtlCol="0">
+            <a:spAutoFit/>
+          </a:bodyPr>
+          <a:lstStyle/>
+          <a:p>
+            <a:r>
+              <a:rPr lang="en-US" sz="800" dirty="0">
+                <a:latin typeface="Arial" panose="020B0604020202020204" pitchFamily="34" charset="0"/>
+                <a:cs typeface="Arial" panose="020B0604020202020204" pitchFamily="34" charset="0"/>
+              </a:rPr>
+              <a:t>Internal</a:t>
+            </a:r>
+          </a:p>
+        </p:txBody>
+      </p:sp>
+      <p:sp>
+        <p:nvSpPr>
+          <p:cNvPr id="132" name="TextBox 131">
+            <a:extLst>
+              <a:ext uri="{FF2B5EF4-FFF2-40B4-BE49-F238E27FC236}">
+                <a16:creationId xmlns:a16="http://schemas.microsoft.com/office/drawing/2014/main" id="{6C95C21B-995D-4950-9063-279FBCA1E330}"/>
+              </a:ext>
+            </a:extLst>
+          </p:cNvPr>
+          <p:cNvSpPr txBox="1"/>
+          <p:nvPr/>
+        </p:nvSpPr>
+        <p:spPr>
+          <a:xfrm>
+            <a:off x="669577" y="4792346"/>
+            <a:ext cx="562975" cy="215444"/>
+          </a:xfrm>
+          <a:prstGeom prst="rect">
+            <a:avLst/>
+          </a:prstGeom>
+          <a:noFill/>
+        </p:spPr>
+        <p:txBody>
+          <a:bodyPr wrap="none" rtlCol="0">
+            <a:spAutoFit/>
+          </a:bodyPr>
+          <a:lstStyle/>
+          <a:p>
+            <a:r>
+              <a:rPr lang="en-US" sz="800" dirty="0">
+                <a:latin typeface="Arial" panose="020B0604020202020204" pitchFamily="34" charset="0"/>
+                <a:cs typeface="Arial" panose="020B0604020202020204" pitchFamily="34" charset="0"/>
+              </a:rPr>
+              <a:t>External</a:t>
+            </a:r>
           </a:p>
         </p:txBody>
       </p:sp>

</xml_diff>